<commit_message>
fix: NGINX Plus OIDC Workflow w/ Ping Identity
</commit_message>
<xml_diff>
--- a/docs/img/nginx-oidc-flow.pptx
+++ b/docs/img/nginx-oidc-flow.pptx
@@ -259,7 +259,7 @@
           <a:p>
             <a:fld id="{FD36D0CE-793F-FB41-AD4F-0C45D94A4FBD}" type="datetimeFigureOut">
               <a:rPr lang="en-US" smtClean="0"/>
-              <a:t>10/4/22</a:t>
+              <a:t>10/11/22</a:t>
             </a:fld>
             <a:endParaRPr lang="en-US"/>
           </a:p>
@@ -457,7 +457,7 @@
           <a:p>
             <a:fld id="{FD36D0CE-793F-FB41-AD4F-0C45D94A4FBD}" type="datetimeFigureOut">
               <a:rPr lang="en-US" smtClean="0"/>
-              <a:t>10/4/22</a:t>
+              <a:t>10/11/22</a:t>
             </a:fld>
             <a:endParaRPr lang="en-US"/>
           </a:p>
@@ -665,7 +665,7 @@
           <a:p>
             <a:fld id="{FD36D0CE-793F-FB41-AD4F-0C45D94A4FBD}" type="datetimeFigureOut">
               <a:rPr lang="en-US" smtClean="0"/>
-              <a:t>10/4/22</a:t>
+              <a:t>10/11/22</a:t>
             </a:fld>
             <a:endParaRPr lang="en-US"/>
           </a:p>
@@ -863,7 +863,7 @@
           <a:p>
             <a:fld id="{FD36D0CE-793F-FB41-AD4F-0C45D94A4FBD}" type="datetimeFigureOut">
               <a:rPr lang="en-US" smtClean="0"/>
-              <a:t>10/4/22</a:t>
+              <a:t>10/11/22</a:t>
             </a:fld>
             <a:endParaRPr lang="en-US"/>
           </a:p>
@@ -1138,7 +1138,7 @@
           <a:p>
             <a:fld id="{FD36D0CE-793F-FB41-AD4F-0C45D94A4FBD}" type="datetimeFigureOut">
               <a:rPr lang="en-US" smtClean="0"/>
-              <a:t>10/4/22</a:t>
+              <a:t>10/11/22</a:t>
             </a:fld>
             <a:endParaRPr lang="en-US"/>
           </a:p>
@@ -1403,7 +1403,7 @@
           <a:p>
             <a:fld id="{FD36D0CE-793F-FB41-AD4F-0C45D94A4FBD}" type="datetimeFigureOut">
               <a:rPr lang="en-US" smtClean="0"/>
-              <a:t>10/4/22</a:t>
+              <a:t>10/11/22</a:t>
             </a:fld>
             <a:endParaRPr lang="en-US"/>
           </a:p>
@@ -1815,7 +1815,7 @@
           <a:p>
             <a:fld id="{FD36D0CE-793F-FB41-AD4F-0C45D94A4FBD}" type="datetimeFigureOut">
               <a:rPr lang="en-US" smtClean="0"/>
-              <a:t>10/4/22</a:t>
+              <a:t>10/11/22</a:t>
             </a:fld>
             <a:endParaRPr lang="en-US"/>
           </a:p>
@@ -1956,7 +1956,7 @@
           <a:p>
             <a:fld id="{FD36D0CE-793F-FB41-AD4F-0C45D94A4FBD}" type="datetimeFigureOut">
               <a:rPr lang="en-US" smtClean="0"/>
-              <a:t>10/4/22</a:t>
+              <a:t>10/11/22</a:t>
             </a:fld>
             <a:endParaRPr lang="en-US"/>
           </a:p>
@@ -2069,7 +2069,7 @@
           <a:p>
             <a:fld id="{FD36D0CE-793F-FB41-AD4F-0C45D94A4FBD}" type="datetimeFigureOut">
               <a:rPr lang="en-US" smtClean="0"/>
-              <a:t>10/4/22</a:t>
+              <a:t>10/11/22</a:t>
             </a:fld>
             <a:endParaRPr lang="en-US"/>
           </a:p>
@@ -2380,7 +2380,7 @@
           <a:p>
             <a:fld id="{FD36D0CE-793F-FB41-AD4F-0C45D94A4FBD}" type="datetimeFigureOut">
               <a:rPr lang="en-US" smtClean="0"/>
-              <a:t>10/4/22</a:t>
+              <a:t>10/11/22</a:t>
             </a:fld>
             <a:endParaRPr lang="en-US"/>
           </a:p>
@@ -2668,7 +2668,7 @@
           <a:p>
             <a:fld id="{FD36D0CE-793F-FB41-AD4F-0C45D94A4FBD}" type="datetimeFigureOut">
               <a:rPr lang="en-US" smtClean="0"/>
-              <a:t>10/4/22</a:t>
+              <a:t>10/11/22</a:t>
             </a:fld>
             <a:endParaRPr lang="en-US"/>
           </a:p>
@@ -2909,7 +2909,7 @@
           <a:p>
             <a:fld id="{FD36D0CE-793F-FB41-AD4F-0C45D94A4FBD}" type="datetimeFigureOut">
               <a:rPr lang="en-US" smtClean="0"/>
-              <a:t>10/4/22</a:t>
+              <a:t>10/11/22</a:t>
             </a:fld>
             <a:endParaRPr lang="en-US"/>
           </a:p>
@@ -6011,10 +6011,10 @@
       </p:sp>
       <p:pic>
         <p:nvPicPr>
-          <p:cNvPr id="54" name="Picture 53" descr="A picture containing company name&#10;&#10;Description automatically generated">
-            <a:extLst>
-              <a:ext uri="{FF2B5EF4-FFF2-40B4-BE49-F238E27FC236}">
-                <a16:creationId xmlns:a16="http://schemas.microsoft.com/office/drawing/2014/main" id="{B22553FC-88A1-CA7C-0268-0B17A5E25EBC}"/>
+          <p:cNvPr id="53" name="Picture 52">
+            <a:extLst>
+              <a:ext uri="{FF2B5EF4-FFF2-40B4-BE49-F238E27FC236}">
+                <a16:creationId xmlns:a16="http://schemas.microsoft.com/office/drawing/2014/main" id="{00C85FFD-FAD7-F3A1-EA37-264AF3D47A37}"/>
               </a:ext>
             </a:extLst>
           </p:cNvPr>
@@ -6031,8 +6031,8 @@
         </p:blipFill>
         <p:spPr>
           <a:xfrm>
-            <a:off x="7322553" y="1848410"/>
-            <a:ext cx="1116173" cy="421337"/>
+            <a:off x="7533930" y="1701282"/>
+            <a:ext cx="715594" cy="715594"/>
           </a:xfrm>
           <a:prstGeom prst="rect">
             <a:avLst/>

</xml_diff>